<commit_message>
Updated to version 3.0.0 (#12)
* Add files via upload

* Update README.md

* Update README.md

* Update README_RULES.TXT

* Add files via upload

* Add files via upload

* Add files via upload

* Add files via upload

* Add files via upload

* Add files via upload

* Add files via upload

* Add files via upload
</commit_message>
<xml_diff>
--- a/Fasty.pptx
+++ b/Fasty.pptx
@@ -852,7 +852,7 @@
           <a:p>
             <a:fld id="{3E24DBBD-9242-4357-A561-20355844280C}" type="datetimeFigureOut">
               <a:rPr lang="ro-RO" smtClean="0"/>
-              <a:t>01.02.2017</a:t>
+              <a:t>06.02.2017</a:t>
             </a:fld>
             <a:endParaRPr lang="ro-RO"/>
           </a:p>
@@ -1103,7 +1103,7 @@
           <a:p>
             <a:fld id="{3E24DBBD-9242-4357-A561-20355844280C}" type="datetimeFigureOut">
               <a:rPr lang="ro-RO" smtClean="0"/>
-              <a:t>01.02.2017</a:t>
+              <a:t>06.02.2017</a:t>
             </a:fld>
             <a:endParaRPr lang="ro-RO"/>
           </a:p>
@@ -1417,7 +1417,7 @@
           <a:p>
             <a:fld id="{3E24DBBD-9242-4357-A561-20355844280C}" type="datetimeFigureOut">
               <a:rPr lang="ro-RO" smtClean="0"/>
-              <a:t>01.02.2017</a:t>
+              <a:t>06.02.2017</a:t>
             </a:fld>
             <a:endParaRPr lang="ro-RO"/>
           </a:p>
@@ -1758,7 +1758,7 @@
           <a:p>
             <a:fld id="{3E24DBBD-9242-4357-A561-20355844280C}" type="datetimeFigureOut">
               <a:rPr lang="ro-RO" smtClean="0"/>
-              <a:t>01.02.2017</a:t>
+              <a:t>06.02.2017</a:t>
             </a:fld>
             <a:endParaRPr lang="ro-RO"/>
           </a:p>
@@ -2072,7 +2072,7 @@
           <a:p>
             <a:fld id="{3E24DBBD-9242-4357-A561-20355844280C}" type="datetimeFigureOut">
               <a:rPr lang="ro-RO" smtClean="0"/>
-              <a:t>01.02.2017</a:t>
+              <a:t>06.02.2017</a:t>
             </a:fld>
             <a:endParaRPr lang="ro-RO"/>
           </a:p>
@@ -2465,7 +2465,7 @@
           <a:p>
             <a:fld id="{3E24DBBD-9242-4357-A561-20355844280C}" type="datetimeFigureOut">
               <a:rPr lang="ro-RO" smtClean="0"/>
-              <a:t>01.02.2017</a:t>
+              <a:t>06.02.2017</a:t>
             </a:fld>
             <a:endParaRPr lang="ro-RO"/>
           </a:p>
@@ -2635,7 +2635,7 @@
           <a:p>
             <a:fld id="{3E24DBBD-9242-4357-A561-20355844280C}" type="datetimeFigureOut">
               <a:rPr lang="ro-RO" smtClean="0"/>
-              <a:t>01.02.2017</a:t>
+              <a:t>06.02.2017</a:t>
             </a:fld>
             <a:endParaRPr lang="ro-RO"/>
           </a:p>
@@ -2815,7 +2815,7 @@
           <a:p>
             <a:fld id="{3E24DBBD-9242-4357-A561-20355844280C}" type="datetimeFigureOut">
               <a:rPr lang="ro-RO" smtClean="0"/>
-              <a:t>01.02.2017</a:t>
+              <a:t>06.02.2017</a:t>
             </a:fld>
             <a:endParaRPr lang="ro-RO"/>
           </a:p>
@@ -2991,7 +2991,7 @@
           <a:p>
             <a:fld id="{3E24DBBD-9242-4357-A561-20355844280C}" type="datetimeFigureOut">
               <a:rPr lang="ro-RO" smtClean="0"/>
-              <a:t>01.02.2017</a:t>
+              <a:t>06.02.2017</a:t>
             </a:fld>
             <a:endParaRPr lang="ro-RO"/>
           </a:p>
@@ -3238,7 +3238,7 @@
           <a:p>
             <a:fld id="{3E24DBBD-9242-4357-A561-20355844280C}" type="datetimeFigureOut">
               <a:rPr lang="ro-RO" smtClean="0"/>
-              <a:t>01.02.2017</a:t>
+              <a:t>06.02.2017</a:t>
             </a:fld>
             <a:endParaRPr lang="ro-RO"/>
           </a:p>
@@ -3470,7 +3470,7 @@
           <a:p>
             <a:fld id="{3E24DBBD-9242-4357-A561-20355844280C}" type="datetimeFigureOut">
               <a:rPr lang="ro-RO" smtClean="0"/>
-              <a:t>01.02.2017</a:t>
+              <a:t>06.02.2017</a:t>
             </a:fld>
             <a:endParaRPr lang="ro-RO"/>
           </a:p>
@@ -3844,7 +3844,7 @@
           <a:p>
             <a:fld id="{3E24DBBD-9242-4357-A561-20355844280C}" type="datetimeFigureOut">
               <a:rPr lang="ro-RO" smtClean="0"/>
-              <a:t>01.02.2017</a:t>
+              <a:t>06.02.2017</a:t>
             </a:fld>
             <a:endParaRPr lang="ro-RO"/>
           </a:p>
@@ -3967,7 +3967,7 @@
           <a:p>
             <a:fld id="{3E24DBBD-9242-4357-A561-20355844280C}" type="datetimeFigureOut">
               <a:rPr lang="ro-RO" smtClean="0"/>
-              <a:t>01.02.2017</a:t>
+              <a:t>06.02.2017</a:t>
             </a:fld>
             <a:endParaRPr lang="ro-RO"/>
           </a:p>
@@ -4062,7 +4062,7 @@
           <a:p>
             <a:fld id="{3E24DBBD-9242-4357-A561-20355844280C}" type="datetimeFigureOut">
               <a:rPr lang="ro-RO" smtClean="0"/>
-              <a:t>01.02.2017</a:t>
+              <a:t>06.02.2017</a:t>
             </a:fld>
             <a:endParaRPr lang="ro-RO"/>
           </a:p>
@@ -4317,7 +4317,7 @@
           <a:p>
             <a:fld id="{3E24DBBD-9242-4357-A561-20355844280C}" type="datetimeFigureOut">
               <a:rPr lang="ro-RO" smtClean="0"/>
-              <a:t>01.02.2017</a:t>
+              <a:t>06.02.2017</a:t>
             </a:fld>
             <a:endParaRPr lang="ro-RO"/>
           </a:p>
@@ -4580,7 +4580,7 @@
           <a:p>
             <a:fld id="{3E24DBBD-9242-4357-A561-20355844280C}" type="datetimeFigureOut">
               <a:rPr lang="ro-RO" smtClean="0"/>
-              <a:t>01.02.2017</a:t>
+              <a:t>06.02.2017</a:t>
             </a:fld>
             <a:endParaRPr lang="ro-RO"/>
           </a:p>
@@ -5323,7 +5323,7 @@
           <a:p>
             <a:fld id="{3E24DBBD-9242-4357-A561-20355844280C}" type="datetimeFigureOut">
               <a:rPr lang="ro-RO" smtClean="0"/>
-              <a:t>01.02.2017</a:t>
+              <a:t>06.02.2017</a:t>
             </a:fld>
             <a:endParaRPr lang="ro-RO"/>
           </a:p>
@@ -5888,29 +5888,22 @@
         </p:nvSpPr>
         <p:spPr/>
         <p:txBody>
-          <a:bodyPr/>
+          <a:bodyPr>
+            <a:normAutofit fontScale="92500" lnSpcReduction="10000"/>
+          </a:bodyPr>
           <a:lstStyle/>
           <a:p>
             <a:pPr algn="ctr"/>
             <a:r>
               <a:rPr lang="ro-RO" dirty="0"/>
-              <a:t>Un joc creat în </a:t>
-            </a:r>
-            <a:r>
-              <a:rPr lang="ro-RO" dirty="0" err="1"/>
-              <a:t>Greenfoot</a:t>
-            </a:r>
-            <a:r>
-              <a:rPr lang="ro-RO" dirty="0"/>
-              <a:t> de Pop Alexandru Radu și </a:t>
-            </a:r>
-            <a:r>
-              <a:rPr lang="ro-RO" dirty="0" err="1"/>
-              <a:t>Petric</a:t>
-            </a:r>
-            <a:r>
-              <a:rPr lang="ro-RO" dirty="0"/>
-              <a:t> Ovidiu Vasiliu</a:t>
+              <a:t>Un joc creat în Greenfoot de Pop Alexandru Radu și Petric Ovidiu Vasiliu</a:t>
+            </a:r>
+          </a:p>
+          <a:p>
+            <a:pPr algn="l"/>
+            <a:r>
+              <a:rPr lang="ro-RO" dirty="0"/>
+              <a:t>     Prof. coordonator: Mureșan Claudia </a:t>
             </a:r>
           </a:p>
           <a:p>
@@ -6018,7 +6011,7 @@
             </a:pPr>
             <a:r>
               <a:rPr lang="ro-RO" dirty="0"/>
-              <a:t>   Se presupune că vă numiți Radu. Ați fost angajat ca șofer pe ambulanță, iar șeful dvs. v-a spus să fiți atent și să luați toți pacienții în timp. După 10 luni, sunteți un angajat bine-cunoscut, iar șeful dvs. vă repartizează într-un nou teritoriu. Nu fiți prea fericit, deoarece este chiar centrul orașului. Nu vă accidentați în construcții!</a:t>
+              <a:t>   Se presupune că vă numiți Radu. Ați fost angajat ca șofer pe ambulanță, iar șeful dvs. v-a spus să fiți atent și să luați toți pacienții în timp. După 5 luni, sunteți un angajat bine-cunoscut, iar șeful dvs. vă repartizează într-un nou teritoriu. Nu fiți prea fericit, deoarece este chiar centrul orașului. Nu vă accidentați în construcții!</a:t>
             </a:r>
           </a:p>
           <a:p>
@@ -6027,7 +6020,7 @@
             </a:pPr>
             <a:r>
               <a:rPr lang="ro-RO" dirty="0"/>
-              <a:t>   După un timp, veți avea dreptul la service gratuit în caz de accident, dar asta doar din 10 în 10 luni.</a:t>
+              <a:t>   După un timp, veți avea dreptul la service gratuit în caz de accident, dar asta doar din 5 în 5 luni.</a:t>
             </a:r>
           </a:p>
           <a:p>
@@ -6036,15 +6029,7 @@
             </a:pPr>
             <a:r>
               <a:rPr lang="ro-RO" dirty="0"/>
-              <a:t>   Și asta e tot pentru acum! Mai</a:t>
-            </a:r>
-            <a:r>
-              <a:rPr lang="en-US" dirty="0"/>
-              <a:t> </a:t>
-            </a:r>
-            <a:r>
-              <a:rPr lang="ro-RO" dirty="0"/>
-              <a:t>multe instrucțiuni pe parcursul jocului. Distracție plăcută!</a:t>
+              <a:t>   Notă: Sarcina utilizatorului este de a colecta toți oamenii din ecran în mai puțin de 15 secunde fără a intra în coliziune cu construcțiile care vor apărea după nivelul 5.</a:t>
             </a:r>
           </a:p>
           <a:p>
@@ -6053,22 +6038,8 @@
             </a:pPr>
             <a:r>
               <a:rPr lang="ro-RO" dirty="0"/>
-              <a:t>Notă: Sarcina utilizatorului este de a colecta toți oamenii din ecran în mai puțin de 12 secunde fără a intra în coliziune cu construcțiile care vor apărea după nivelul 10.</a:t>
-            </a:r>
-          </a:p>
-          <a:p>
-            <a:pPr marL="0" indent="0">
-              <a:buNone/>
-            </a:pPr>
-            <a:r>
-              <a:rPr lang="ro-RO" dirty="0"/>
-              <a:t>   După nivelul 35 vă așteaptă un „boss” pe care va trebui </a:t>
-            </a:r>
-            <a:r>
-              <a:rPr lang="ro-RO"/>
-              <a:t>să-l călcați de 3 ori. </a:t>
-            </a:r>
-            <a:endParaRPr lang="ro-RO" dirty="0"/>
+              <a:t>   La nivelul 20 vă așteaptă un „boss” pe care va trebui să-l călcați de 3 ori, după care veți putea să continuați jocul dacă veți dori.</a:t>
+            </a:r>
           </a:p>
         </p:txBody>
       </p:sp>
@@ -6145,15 +6116,7 @@
           <a:p>
             <a:r>
               <a:rPr lang="ro-RO" dirty="0"/>
-              <a:t>Știm că </a:t>
-            </a:r>
-            <a:r>
-              <a:rPr lang="ro-RO" dirty="0" err="1"/>
-              <a:t>Greenfoot</a:t>
-            </a:r>
-            <a:r>
-              <a:rPr lang="ro-RO" dirty="0"/>
-              <a:t> permite rearanjarea lumii după ce aceasta a fost construită. Nu e corect să o rearanjați, exceptând cazurile de depanare.</a:t>
+              <a:t>Știm că Greenfoot permite rearanjarea lumii după ce aceasta a fost construită. Nu e corect să o rearanjați, exceptând cazurile de depanare.</a:t>
             </a:r>
           </a:p>
           <a:p>
@@ -6165,7 +6128,7 @@
           <a:p>
             <a:r>
               <a:rPr lang="ro-RO" dirty="0"/>
-              <a:t>Mai multe informații în timpul jocului, deci fiți pe fază (nu vă faceți griji, vom pune jocul pe pauză)</a:t>
+              <a:t>Veți primi informații și în timpul jocului, deci fiți pe fază (nu vă faceți griji, vom pune jocul pe pauză)</a:t>
             </a:r>
           </a:p>
           <a:p>
@@ -6184,23 +6147,6 @@
             <a:r>
               <a:rPr lang="ro-RO" dirty="0"/>
               <a:t>.</a:t>
-            </a:r>
-          </a:p>
-          <a:p>
-            <a:pPr marL="0" indent="0">
-              <a:buNone/>
-            </a:pPr>
-            <a:r>
-              <a:rPr lang="ro-RO" dirty="0"/>
-              <a:t>   Notă: Extindeți fereastra </a:t>
-            </a:r>
-            <a:r>
-              <a:rPr lang="ro-RO" dirty="0" err="1"/>
-              <a:t>Greenfoot</a:t>
-            </a:r>
-            <a:r>
-              <a:rPr lang="ro-RO" dirty="0"/>
-              <a:t> Terminal pentru a vedea întreg mesajul ce va apărea.</a:t>
             </a:r>
           </a:p>
         </p:txBody>
@@ -6273,12 +6219,14 @@
         </p:nvSpPr>
         <p:spPr>
           <a:xfrm>
-            <a:off x="677334" y="2160589"/>
-            <a:ext cx="8596668" cy="4358964"/>
+            <a:off x="677334" y="1754909"/>
+            <a:ext cx="8596668" cy="4764644"/>
           </a:xfrm>
         </p:spPr>
         <p:txBody>
-          <a:bodyPr/>
+          <a:bodyPr>
+            <a:normAutofit lnSpcReduction="10000"/>
+          </a:bodyPr>
           <a:lstStyle/>
           <a:p>
             <a:pPr marL="0" indent="0">
@@ -6286,7 +6234,7 @@
             </a:pPr>
             <a:r>
               <a:rPr lang="ro-RO" dirty="0"/>
-              <a:t>   Jocul s-a născut din simple teste de cunoștințe, dar s-a dovedit a avea un potențial ridicat…așa că îl vom exploata :) .</a:t>
+              <a:t>   Jocul s-a născut din simple teste de cunoștințe, dar s-a dovedit a avea un potențial ridicat … așa că îl vom exploata :) .</a:t>
             </a:r>
           </a:p>
           <a:p>
@@ -6330,15 +6278,7 @@
             </a:pPr>
             <a:r>
               <a:rPr lang="ro-RO" dirty="0"/>
-              <a:t>      </a:t>
-            </a:r>
-            <a:r>
-              <a:rPr lang="ro-RO" dirty="0" err="1"/>
-              <a:t>-apăsați</a:t>
-            </a:r>
-            <a:r>
-              <a:rPr lang="ro-RO" dirty="0"/>
-              <a:t> „</a:t>
+              <a:t>      -apăsați „</a:t>
             </a:r>
             <a:r>
               <a:rPr lang="ro-RO" dirty="0" err="1"/>
@@ -6377,43 +6317,77 @@
             </a:pPr>
             <a:r>
               <a:rPr lang="ro-RO" dirty="0"/>
-              <a:t>      </a:t>
+              <a:t>      -săgeți sau WASD pentru mișcare</a:t>
+            </a:r>
+          </a:p>
+          <a:p>
+            <a:pPr marL="0" indent="0">
+              <a:buNone/>
+            </a:pPr>
+            <a:r>
+              <a:rPr lang="ro-RO" dirty="0"/>
+              <a:t>      -Q pentru a folosi puterea timp bonus (nivel 5+)</a:t>
+            </a:r>
+          </a:p>
+          <a:p>
+            <a:pPr marL="0" indent="0">
+              <a:buNone/>
+            </a:pPr>
+            <a:r>
+              <a:rPr lang="ro-RO" dirty="0"/>
+              <a:t>      -E pentru a folosi puterea viață bonus (nivel 10+)</a:t>
+            </a:r>
+          </a:p>
+          <a:p>
+            <a:pPr marL="0" indent="0">
+              <a:buNone/>
+            </a:pPr>
+            <a:r>
+              <a:rPr lang="ro-RO" dirty="0"/>
+              <a:t>      -P pentru pauză</a:t>
+            </a:r>
+          </a:p>
+          <a:p>
+            <a:pPr marL="0" indent="0">
+              <a:buNone/>
+            </a:pPr>
+            <a:r>
+              <a:rPr lang="ro-RO" dirty="0"/>
+              <a:t>   </a:t>
+            </a:r>
+            <a:r>
+              <a:rPr lang="ro-RO" b="1" dirty="0"/>
+              <a:t>Not</a:t>
+            </a:r>
+            <a:r>
+              <a:rPr lang="ro-RO" b="1" dirty="0"/>
+              <a:t>ă: </a:t>
+            </a:r>
+            <a:r>
+              <a:rPr lang="ro-RO" dirty="0"/>
+              <a:t>Textul „</a:t>
             </a:r>
             <a:r>
               <a:rPr lang="ro-RO" dirty="0" err="1"/>
-              <a:t>-săgeți</a:t>
-            </a:r>
-            <a:r>
-              <a:rPr lang="ro-RO" dirty="0"/>
-              <a:t> sau WASD pentru mișcare</a:t>
-            </a:r>
-          </a:p>
-          <a:p>
-            <a:pPr marL="0" indent="0">
-              <a:buNone/>
-            </a:pPr>
-            <a:r>
-              <a:rPr lang="ro-RO" dirty="0"/>
-              <a:t>      -Q pentru a folosi puterea timp bonus</a:t>
-            </a:r>
-          </a:p>
-          <a:p>
-            <a:pPr marL="0" indent="0">
-              <a:buNone/>
-            </a:pPr>
-            <a:r>
-              <a:rPr lang="ro-RO" dirty="0"/>
-              <a:t>      -E pentru a folosi puterea viață bonus</a:t>
-            </a:r>
-          </a:p>
-          <a:p>
-            <a:pPr marL="0" indent="0">
-              <a:buNone/>
-            </a:pPr>
-            <a:r>
-              <a:rPr lang="ro-RO" dirty="0"/>
-              <a:t>      -P pentru pauză</a:t>
-            </a:r>
+              <a:t>Level</a:t>
+            </a:r>
+            <a:r>
+              <a:rPr lang="ro-RO" dirty="0"/>
+              <a:t>/</a:t>
+            </a:r>
+            <a:r>
+              <a:rPr lang="ro-RO" dirty="0" err="1"/>
+              <a:t>saved</a:t>
+            </a:r>
+            <a:r>
+              <a:rPr lang="ro-RO" dirty="0"/>
+              <a:t>/total” reprezintă „nivelul și omuleții salvați din totalul de </a:t>
+            </a:r>
+            <a:r>
+              <a:rPr lang="ro-RO"/>
+              <a:t>X omuleți”.</a:t>
+            </a:r>
+            <a:endParaRPr lang="ro-RO" dirty="0"/>
           </a:p>
         </p:txBody>
       </p:sp>
@@ -6507,53 +6481,57 @@
             </a:pPr>
             <a:r>
               <a:rPr lang="ro-RO" dirty="0"/>
+              <a:t>      -se creează o lume și se pun </a:t>
+            </a:r>
+            <a:r>
+              <a:rPr lang="ro-RO" b="1" dirty="0"/>
+              <a:t>10+nivel actual</a:t>
+            </a:r>
+            <a:r>
+              <a:rPr lang="ro-RO" dirty="0"/>
+              <a:t> actori băieți </a:t>
+            </a:r>
+          </a:p>
+          <a:p>
+            <a:pPr marL="0" indent="0">
+              <a:buNone/>
+            </a:pPr>
+            <a:r>
+              <a:rPr lang="ro-RO" dirty="0"/>
               <a:t>      </a:t>
             </a:r>
             <a:r>
-              <a:rPr lang="ro-RO" dirty="0" err="1"/>
-              <a:t>-se</a:t>
-            </a:r>
-            <a:r>
-              <a:rPr lang="ro-RO" dirty="0"/>
-              <a:t> creează o lume și se pun </a:t>
-            </a:r>
-            <a:r>
-              <a:rPr lang="ro-RO" b="1" dirty="0"/>
-              <a:t>n</a:t>
-            </a:r>
-            <a:r>
-              <a:rPr lang="ro-RO" dirty="0"/>
-              <a:t> actori băieți (20</a:t>
-            </a:r>
-            <a:r>
-              <a:rPr lang="en-US" b="1" dirty="0"/>
-              <a:t>&lt;n&lt;</a:t>
-            </a:r>
-            <a:r>
               <a:rPr lang="en-US" dirty="0"/>
-              <a:t>30</a:t>
-            </a:r>
-            <a:r>
-              <a:rPr lang="ro-RO" dirty="0"/>
-              <a:t>)</a:t>
-            </a:r>
-            <a:endParaRPr lang="en-US" dirty="0"/>
+              <a:t>-se </a:t>
+            </a:r>
+            <a:r>
+              <a:rPr lang="ro-RO" dirty="0"/>
+              <a:t>adaugă o ambulanță și, dacă nivelul este mai mare </a:t>
+            </a:r>
+            <a:r>
+              <a:rPr lang="ro-RO"/>
+              <a:t>de 5, </a:t>
+            </a:r>
+            <a:r>
+              <a:rPr lang="ro-RO" dirty="0"/>
+              <a:t>3</a:t>
+            </a:r>
+            <a:r>
+              <a:rPr lang="ro-RO"/>
+              <a:t> </a:t>
+            </a:r>
+            <a:r>
+              <a:rPr lang="ro-RO" dirty="0"/>
+              <a:t>construcții</a:t>
+            </a:r>
           </a:p>
           <a:p>
             <a:pPr marL="0" indent="0">
               <a:buNone/>
             </a:pPr>
             <a:r>
-              <a:rPr lang="en-US" dirty="0"/>
-              <a:t>      -se </a:t>
-            </a:r>
-            <a:r>
-              <a:rPr lang="en-US" dirty="0" err="1"/>
-              <a:t>adaug</a:t>
-            </a:r>
-            <a:r>
-              <a:rPr lang="ro-RO" dirty="0"/>
-              <a:t>ă o ambulanță și, dacă nivelul este mai mare de 10, 5 construcții</a:t>
+              <a:rPr lang="ro-RO" dirty="0"/>
+              <a:t>      -se creează un fișier numit „res.txt” care conține datele utilizatorului (dacă acesta există deja, nu va fi înlocuit de unul nou)</a:t>
             </a:r>
           </a:p>
           <a:p>
@@ -6562,40 +6540,7 @@
             </a:pPr>
             <a:r>
               <a:rPr lang="ro-RO" dirty="0"/>
-              <a:t>      </a:t>
-            </a:r>
-            <a:r>
-              <a:rPr lang="ro-RO" dirty="0" err="1"/>
-              <a:t>-se</a:t>
-            </a:r>
-            <a:r>
-              <a:rPr lang="ro-RO" dirty="0"/>
-              <a:t> creează un fișier numit „</a:t>
-            </a:r>
-            <a:r>
-              <a:rPr lang="ro-RO" dirty="0" err="1"/>
-              <a:t>res.txt</a:t>
-            </a:r>
-            <a:r>
-              <a:rPr lang="ro-RO" dirty="0"/>
-              <a:t>” care conține datele utilizatorului (dacă acesta există deja, nu va fi înlocuit de unul nou)</a:t>
-            </a:r>
-          </a:p>
-          <a:p>
-            <a:pPr marL="0" indent="0">
-              <a:buNone/>
-            </a:pPr>
-            <a:r>
-              <a:rPr lang="ro-RO" dirty="0"/>
-              <a:t>      </a:t>
-            </a:r>
-            <a:r>
-              <a:rPr lang="ro-RO" dirty="0" err="1"/>
-              <a:t>-clasa</a:t>
-            </a:r>
-            <a:r>
-              <a:rPr lang="ro-RO" dirty="0"/>
-              <a:t> „</a:t>
+              <a:t>      -clasa „</a:t>
             </a:r>
             <a:r>
               <a:rPr lang="ro-RO" dirty="0" err="1"/>
@@ -6620,23 +6565,7 @@
             </a:pPr>
             <a:r>
               <a:rPr lang="ro-RO" dirty="0"/>
-              <a:t>      </a:t>
-            </a:r>
-            <a:r>
-              <a:rPr lang="ro-RO" dirty="0" err="1"/>
-              <a:t>-celelalte</a:t>
-            </a:r>
-            <a:r>
-              <a:rPr lang="ro-RO" dirty="0"/>
-              <a:t> clase au o </a:t>
-            </a:r>
-            <a:r>
-              <a:rPr lang="ro-RO" dirty="0" err="1"/>
-              <a:t>funție</a:t>
-            </a:r>
-            <a:r>
-              <a:rPr lang="ro-RO" dirty="0"/>
-              <a:t> „</a:t>
+              <a:t>      -celelalte clase au o funcție „</a:t>
             </a:r>
             <a:r>
               <a:rPr lang="ro-RO" dirty="0" err="1"/>
@@ -6661,23 +6590,7 @@
             </a:pPr>
             <a:r>
               <a:rPr lang="ro-RO" dirty="0"/>
-              <a:t>   S-a folosit documentația </a:t>
-            </a:r>
-            <a:r>
-              <a:rPr lang="ro-RO" dirty="0" err="1"/>
-              <a:t>Greenfoot</a:t>
-            </a:r>
-            <a:r>
-              <a:rPr lang="ro-RO" dirty="0"/>
-              <a:t> și unele informații de pe site-ul </a:t>
-            </a:r>
-            <a:r>
-              <a:rPr lang="ro-RO" dirty="0" err="1"/>
-              <a:t>stackexchange.com</a:t>
-            </a:r>
-            <a:r>
-              <a:rPr lang="ro-RO" dirty="0"/>
-              <a:t> (informații privitoare la optimizarea fișierului de proprietăți)</a:t>
+              <a:t>   S-a folosit documentația Greenfoot și unele informații de pe site-ul stackexchange.com (informații privitoare la optimizarea fișierului de proprietăți)</a:t>
             </a:r>
           </a:p>
         </p:txBody>
@@ -6757,15 +6670,7 @@
           <a:p>
             <a:r>
               <a:rPr lang="ro-RO" dirty="0"/>
-              <a:t>   Limba implicită a jocului este engleza. Asta ne va ajuta să creăm un joc ce va fi mai ușor de </a:t>
-            </a:r>
-            <a:r>
-              <a:rPr lang="ro-RO" dirty="0" err="1"/>
-              <a:t>externalizat</a:t>
-            </a:r>
-            <a:r>
-              <a:rPr lang="ro-RO" dirty="0"/>
-              <a:t>. De asemenea, nu am găsit informații privitoare la limba pe care ar trebui să o aibă jocul.</a:t>
+              <a:t>   Limba implicită a jocului este engleza. Asta ne va ajuta să creăm un joc ce va fi mai ușor de externalizat. De asemenea, nu am găsit informații privitoare la limba pe care ar trebui să o aibă jocul.</a:t>
             </a:r>
           </a:p>
           <a:p>
@@ -6781,15 +6686,7 @@
             </a:r>
             <a:r>
               <a:rPr lang="ro-RO" dirty="0"/>
-              <a:t> și a fost încărcat de noi pentru a putea beneficia din plin de facilitățile oferite de </a:t>
-            </a:r>
-            <a:r>
-              <a:rPr lang="ro-RO" dirty="0" err="1"/>
-              <a:t>Github</a:t>
-            </a:r>
-            <a:r>
-              <a:rPr lang="ro-RO" dirty="0"/>
-              <a:t> cum ar fi compararea versiunilor conținutului fișierelor.</a:t>
+              <a:t> și a fost încărcat de noi pentru a putea beneficia din plin de facilitățile oferite de Github cum ar fi compararea versiunilor conținutului fișierelor.</a:t>
             </a:r>
           </a:p>
           <a:p>

</xml_diff>

<commit_message>
Add files via upload (#17)
</commit_message>
<xml_diff>
--- a/Fasty.pptx
+++ b/Fasty.pptx
@@ -8,8 +8,8 @@
     <p:sldId id="256" r:id="rId2"/>
     <p:sldId id="257" r:id="rId3"/>
     <p:sldId id="258" r:id="rId4"/>
-    <p:sldId id="259" r:id="rId5"/>
-    <p:sldId id="260" r:id="rId6"/>
+    <p:sldId id="260" r:id="rId5"/>
+    <p:sldId id="259" r:id="rId6"/>
     <p:sldId id="261" r:id="rId7"/>
     <p:sldId id="262" r:id="rId8"/>
     <p:sldId id="263" r:id="rId9"/>
@@ -852,7 +852,7 @@
           <a:p>
             <a:fld id="{3E24DBBD-9242-4357-A561-20355844280C}" type="datetimeFigureOut">
               <a:rPr lang="ro-RO" smtClean="0"/>
-              <a:t>08.02.2017</a:t>
+              <a:t>09.02.2017</a:t>
             </a:fld>
             <a:endParaRPr lang="ro-RO"/>
           </a:p>
@@ -1103,7 +1103,7 @@
           <a:p>
             <a:fld id="{3E24DBBD-9242-4357-A561-20355844280C}" type="datetimeFigureOut">
               <a:rPr lang="ro-RO" smtClean="0"/>
-              <a:t>08.02.2017</a:t>
+              <a:t>09.02.2017</a:t>
             </a:fld>
             <a:endParaRPr lang="ro-RO"/>
           </a:p>
@@ -1417,7 +1417,7 @@
           <a:p>
             <a:fld id="{3E24DBBD-9242-4357-A561-20355844280C}" type="datetimeFigureOut">
               <a:rPr lang="ro-RO" smtClean="0"/>
-              <a:t>08.02.2017</a:t>
+              <a:t>09.02.2017</a:t>
             </a:fld>
             <a:endParaRPr lang="ro-RO"/>
           </a:p>
@@ -1758,7 +1758,7 @@
           <a:p>
             <a:fld id="{3E24DBBD-9242-4357-A561-20355844280C}" type="datetimeFigureOut">
               <a:rPr lang="ro-RO" smtClean="0"/>
-              <a:t>08.02.2017</a:t>
+              <a:t>09.02.2017</a:t>
             </a:fld>
             <a:endParaRPr lang="ro-RO"/>
           </a:p>
@@ -2072,7 +2072,7 @@
           <a:p>
             <a:fld id="{3E24DBBD-9242-4357-A561-20355844280C}" type="datetimeFigureOut">
               <a:rPr lang="ro-RO" smtClean="0"/>
-              <a:t>08.02.2017</a:t>
+              <a:t>09.02.2017</a:t>
             </a:fld>
             <a:endParaRPr lang="ro-RO"/>
           </a:p>
@@ -2465,7 +2465,7 @@
           <a:p>
             <a:fld id="{3E24DBBD-9242-4357-A561-20355844280C}" type="datetimeFigureOut">
               <a:rPr lang="ro-RO" smtClean="0"/>
-              <a:t>08.02.2017</a:t>
+              <a:t>09.02.2017</a:t>
             </a:fld>
             <a:endParaRPr lang="ro-RO"/>
           </a:p>
@@ -2635,7 +2635,7 @@
           <a:p>
             <a:fld id="{3E24DBBD-9242-4357-A561-20355844280C}" type="datetimeFigureOut">
               <a:rPr lang="ro-RO" smtClean="0"/>
-              <a:t>08.02.2017</a:t>
+              <a:t>09.02.2017</a:t>
             </a:fld>
             <a:endParaRPr lang="ro-RO"/>
           </a:p>
@@ -2815,7 +2815,7 @@
           <a:p>
             <a:fld id="{3E24DBBD-9242-4357-A561-20355844280C}" type="datetimeFigureOut">
               <a:rPr lang="ro-RO" smtClean="0"/>
-              <a:t>08.02.2017</a:t>
+              <a:t>09.02.2017</a:t>
             </a:fld>
             <a:endParaRPr lang="ro-RO"/>
           </a:p>
@@ -2991,7 +2991,7 @@
           <a:p>
             <a:fld id="{3E24DBBD-9242-4357-A561-20355844280C}" type="datetimeFigureOut">
               <a:rPr lang="ro-RO" smtClean="0"/>
-              <a:t>08.02.2017</a:t>
+              <a:t>09.02.2017</a:t>
             </a:fld>
             <a:endParaRPr lang="ro-RO"/>
           </a:p>
@@ -3238,7 +3238,7 @@
           <a:p>
             <a:fld id="{3E24DBBD-9242-4357-A561-20355844280C}" type="datetimeFigureOut">
               <a:rPr lang="ro-RO" smtClean="0"/>
-              <a:t>08.02.2017</a:t>
+              <a:t>09.02.2017</a:t>
             </a:fld>
             <a:endParaRPr lang="ro-RO"/>
           </a:p>
@@ -3470,7 +3470,7 @@
           <a:p>
             <a:fld id="{3E24DBBD-9242-4357-A561-20355844280C}" type="datetimeFigureOut">
               <a:rPr lang="ro-RO" smtClean="0"/>
-              <a:t>08.02.2017</a:t>
+              <a:t>09.02.2017</a:t>
             </a:fld>
             <a:endParaRPr lang="ro-RO"/>
           </a:p>
@@ -3844,7 +3844,7 @@
           <a:p>
             <a:fld id="{3E24DBBD-9242-4357-A561-20355844280C}" type="datetimeFigureOut">
               <a:rPr lang="ro-RO" smtClean="0"/>
-              <a:t>08.02.2017</a:t>
+              <a:t>09.02.2017</a:t>
             </a:fld>
             <a:endParaRPr lang="ro-RO"/>
           </a:p>
@@ -3967,7 +3967,7 @@
           <a:p>
             <a:fld id="{3E24DBBD-9242-4357-A561-20355844280C}" type="datetimeFigureOut">
               <a:rPr lang="ro-RO" smtClean="0"/>
-              <a:t>08.02.2017</a:t>
+              <a:t>09.02.2017</a:t>
             </a:fld>
             <a:endParaRPr lang="ro-RO"/>
           </a:p>
@@ -4062,7 +4062,7 @@
           <a:p>
             <a:fld id="{3E24DBBD-9242-4357-A561-20355844280C}" type="datetimeFigureOut">
               <a:rPr lang="ro-RO" smtClean="0"/>
-              <a:t>08.02.2017</a:t>
+              <a:t>09.02.2017</a:t>
             </a:fld>
             <a:endParaRPr lang="ro-RO"/>
           </a:p>
@@ -4317,7 +4317,7 @@
           <a:p>
             <a:fld id="{3E24DBBD-9242-4357-A561-20355844280C}" type="datetimeFigureOut">
               <a:rPr lang="ro-RO" smtClean="0"/>
-              <a:t>08.02.2017</a:t>
+              <a:t>09.02.2017</a:t>
             </a:fld>
             <a:endParaRPr lang="ro-RO"/>
           </a:p>
@@ -4580,7 +4580,7 @@
           <a:p>
             <a:fld id="{3E24DBBD-9242-4357-A561-20355844280C}" type="datetimeFigureOut">
               <a:rPr lang="ro-RO" smtClean="0"/>
-              <a:t>08.02.2017</a:t>
+              <a:t>09.02.2017</a:t>
             </a:fld>
             <a:endParaRPr lang="ro-RO"/>
           </a:p>
@@ -5323,7 +5323,7 @@
           <a:p>
             <a:fld id="{3E24DBBD-9242-4357-A561-20355844280C}" type="datetimeFigureOut">
               <a:rPr lang="ro-RO" smtClean="0"/>
-              <a:t>08.02.2017</a:t>
+              <a:t>09.02.2017</a:t>
             </a:fld>
             <a:endParaRPr lang="ro-RO"/>
           </a:p>
@@ -5886,29 +5886,46 @@
             <p:ph type="subTitle" idx="1"/>
           </p:nvPr>
         </p:nvSpPr>
-        <p:spPr/>
+        <p:spPr>
+          <a:xfrm>
+            <a:off x="0" y="3471863"/>
+            <a:ext cx="12192000" cy="3028950"/>
+          </a:xfrm>
+        </p:spPr>
         <p:txBody>
           <a:bodyPr>
-            <a:normAutofit fontScale="92500" lnSpcReduction="10000"/>
+            <a:normAutofit/>
           </a:bodyPr>
           <a:lstStyle/>
           <a:p>
-            <a:pPr algn="ctr"/>
-            <a:r>
-              <a:rPr lang="ro-RO" dirty="0"/>
-              <a:t>Un joc creat în Greenfoot de Pop Alexandru Radu și Petric Ovidiu Vasiliu</a:t>
-            </a:r>
-          </a:p>
-          <a:p>
-            <a:pPr algn="l"/>
-            <a:r>
-              <a:rPr lang="ro-RO" dirty="0"/>
-              <a:t>     Prof. coordonator: Mureșan Claudia </a:t>
-            </a:r>
-          </a:p>
-          <a:p>
-            <a:r>
-              <a:rPr lang="ro-RO" sz="2000" b="1" dirty="0">
+            <a:pPr algn="just"/>
+            <a:r>
+              <a:rPr lang="ro-RO" sz="3400" dirty="0" smtClean="0"/>
+              <a:t>Un </a:t>
+            </a:r>
+            <a:r>
+              <a:rPr lang="ro-RO" sz="3400" dirty="0"/>
+              <a:t>joc creat în Greenfoot de Pop Alexandru Radu și Petric Ovidiu Vasiliu</a:t>
+            </a:r>
+          </a:p>
+          <a:p>
+            <a:pPr algn="just"/>
+            <a:r>
+              <a:rPr lang="ro-RO" sz="3400" dirty="0" smtClean="0"/>
+              <a:t>Prof</a:t>
+            </a:r>
+            <a:r>
+              <a:rPr lang="ro-RO" sz="3400" dirty="0"/>
+              <a:t>. coordonator: Mureșan Claudia</a:t>
+            </a:r>
+            <a:r>
+              <a:rPr lang="ro-RO" dirty="0"/>
+              <a:t> </a:t>
+            </a:r>
+          </a:p>
+          <a:p>
+            <a:r>
+              <a:rPr lang="ro-RO" sz="2800" b="1" dirty="0">
                 <a:solidFill>
                   <a:schemeClr val="tx1">
                     <a:lumMod val="65000"/>
@@ -5919,7 +5936,7 @@
               <a:t>Să începem</a:t>
             </a:r>
             <a:r>
-              <a:rPr lang="ro-RO" dirty="0"/>
+              <a:rPr lang="ro-RO" sz="2800" dirty="0"/>
               <a:t>…</a:t>
             </a:r>
           </a:p>
@@ -5943,6 +5960,13 @@
       <p:transition/>
     </mc:Fallback>
   </mc:AlternateContent>
+  <p:timing>
+    <p:tnLst>
+      <p:par>
+        <p:cTn id="1" dur="indefinite" restart="never" nodeType="tmRoot"/>
+      </p:par>
+    </p:tnLst>
+  </p:timing>
 </p:sld>
 </file>
 
@@ -5998,55 +6022,57 @@
         </p:nvSpPr>
         <p:spPr>
           <a:xfrm>
-            <a:off x="677333" y="2160589"/>
+            <a:off x="476203" y="1431927"/>
             <a:ext cx="8998929" cy="3880773"/>
           </a:xfrm>
         </p:spPr>
         <p:txBody>
-          <a:bodyPr/>
-          <a:lstStyle/>
-          <a:p>
-            <a:pPr marL="0" indent="0">
+          <a:bodyPr>
+            <a:noAutofit/>
+          </a:bodyPr>
+          <a:lstStyle/>
+          <a:p>
+            <a:pPr marL="0" indent="0" algn="just">
               <a:buNone/>
             </a:pPr>
             <a:r>
-              <a:rPr lang="ro-RO" dirty="0"/>
+              <a:rPr lang="ro-RO" sz="2000" dirty="0"/>
               <a:t>   Se presupune că vă numiți Radu. Ați fost angajat ca șofer pe ambulanță, iar șeful dvs. v-a spus să fiți atent și să luați toți pacienții în timp. După 5 luni, sunteți un angajat bine-cunoscut, iar șeful dvs. vă repartizează într-un nou teritoriu. Nu fiți prea fericit, deoarece este chiar centrul orașului. Nu vă accidentați în construcții!</a:t>
             </a:r>
           </a:p>
           <a:p>
-            <a:pPr marL="0" indent="0">
+            <a:pPr marL="0" indent="0" algn="just">
               <a:buNone/>
             </a:pPr>
             <a:r>
-              <a:rPr lang="ro-RO" dirty="0"/>
+              <a:rPr lang="ro-RO" sz="2000" dirty="0"/>
               <a:t>   După un timp, veți avea dreptul la service gratuit în caz de accident, dar asta doar din 5 în 5 luni.</a:t>
             </a:r>
           </a:p>
           <a:p>
-            <a:pPr marL="0" indent="0">
+            <a:pPr marL="0" indent="0" algn="just">
               <a:buNone/>
             </a:pPr>
             <a:r>
-              <a:rPr lang="ro-RO" dirty="0"/>
+              <a:rPr lang="ro-RO" sz="2000" dirty="0"/>
               <a:t>   Jocul se complică progresiv, avându-se în vedere nivelul jucătorului.</a:t>
             </a:r>
           </a:p>
           <a:p>
-            <a:pPr marL="0" indent="0">
+            <a:pPr marL="0" indent="0" algn="just">
               <a:buNone/>
             </a:pPr>
             <a:r>
-              <a:rPr lang="ro-RO" dirty="0"/>
+              <a:rPr lang="ro-RO" sz="2000" dirty="0"/>
               <a:t>   Notă: Sarcina utilizatorului este de a colecta toți oamenii din ecran în mai puțin de 15 secunde fără a intra în coliziune cu construcțiile care vor apărea după nivelul 5.</a:t>
             </a:r>
           </a:p>
           <a:p>
-            <a:pPr marL="0" indent="0">
+            <a:pPr marL="0" indent="0" algn="just">
               <a:buNone/>
             </a:pPr>
             <a:r>
-              <a:rPr lang="ro-RO" dirty="0"/>
+              <a:rPr lang="ro-RO" sz="2000" dirty="0"/>
               <a:t>   La nivelul 20 vă așteaptă un „boss” pe care va trebui să-l călcați de 3 ori, după care veți putea să continuați jocul dacă veți dori.</a:t>
             </a:r>
           </a:p>
@@ -6065,6 +6091,13 @@
   <p:transition spd="med">
     <p:pull/>
   </p:transition>
+  <p:timing>
+    <p:tnLst>
+      <p:par>
+        <p:cTn id="1" dur="indefinite" restart="never" nodeType="tmRoot"/>
+      </p:par>
+    </p:tnLst>
+  </p:timing>
 </p:sld>
 </file>
 
@@ -6173,6 +6206,13 @@
   <p:transition spd="med">
     <p:pull/>
   </p:transition>
+  <p:timing>
+    <p:tnLst>
+      <p:par>
+        <p:cTn id="1" dur="indefinite" restart="never" nodeType="tmRoot"/>
+      </p:par>
+    </p:tnLst>
+  </p:timing>
 </p:sld>
 </file>
 
@@ -6211,7 +6251,7 @@
             <a:pPr algn="ctr"/>
             <a:r>
               <a:rPr lang="ro-RO" dirty="0"/>
-              <a:t>Idee și execuție</a:t>
+              <a:t>Algoritmul folosit</a:t>
             </a:r>
           </a:p>
         </p:txBody>
@@ -6228,14 +6268,12 @@
         </p:nvSpPr>
         <p:spPr>
           <a:xfrm>
-            <a:off x="677334" y="1754909"/>
-            <a:ext cx="8596668" cy="4764644"/>
+            <a:off x="677334" y="1448791"/>
+            <a:ext cx="8596668" cy="4592572"/>
           </a:xfrm>
         </p:spPr>
         <p:txBody>
-          <a:bodyPr>
-            <a:normAutofit fontScale="92500" lnSpcReduction="10000"/>
-          </a:bodyPr>
+          <a:bodyPr/>
           <a:lstStyle/>
           <a:p>
             <a:pPr marL="0" indent="0">
@@ -6243,8 +6281,140 @@
             </a:pPr>
             <a:r>
               <a:rPr lang="ro-RO" dirty="0"/>
-              <a:t>   Jocul s-a născut din simple teste de cunoștințe, dar s-a dovedit a avea un potențial ridicat … așa că îl vom exploata :) .</a:t>
-            </a:r>
+              <a:t>   Structura algoritmului este următoarea:</a:t>
+            </a:r>
+          </a:p>
+          <a:p>
+            <a:pPr indent="14288"/>
+            <a:r>
+              <a:rPr lang="ro-RO" dirty="0" smtClean="0"/>
+              <a:t>se </a:t>
+            </a:r>
+            <a:r>
+              <a:rPr lang="ro-RO" dirty="0"/>
+              <a:t>creează un fișier numit „res.txt” care conține datele utilizatorului (dacă acesta există deja, nu va fi înlocuit de unul nou</a:t>
+            </a:r>
+            <a:r>
+              <a:rPr lang="ro-RO" dirty="0" smtClean="0"/>
+              <a:t>)</a:t>
+            </a:r>
+            <a:r>
+              <a:rPr lang="en-US" dirty="0" smtClean="0"/>
+              <a:t>;</a:t>
+            </a:r>
+            <a:endParaRPr lang="ro-RO" dirty="0"/>
+          </a:p>
+          <a:p>
+            <a:pPr indent="14288"/>
+            <a:r>
+              <a:rPr lang="en-US" dirty="0" smtClean="0"/>
+              <a:t>se </a:t>
+            </a:r>
+            <a:r>
+              <a:rPr lang="ro-RO" dirty="0"/>
+              <a:t>adaugă o ambulanță și, dacă nivelul este mai mare de 5, 3 construcții, respectiv, dacă este mai mare decât 10, 5 construcții în </a:t>
+            </a:r>
+            <a:r>
+              <a:rPr lang="ro-RO" dirty="0" smtClean="0"/>
+              <a:t>total</a:t>
+            </a:r>
+            <a:r>
+              <a:rPr lang="en-US" dirty="0" smtClean="0"/>
+              <a:t>;</a:t>
+            </a:r>
+            <a:endParaRPr lang="ro-RO" dirty="0"/>
+          </a:p>
+          <a:p>
+            <a:pPr indent="14288"/>
+            <a:r>
+              <a:rPr lang="ro-RO" dirty="0" smtClean="0"/>
+              <a:t>se </a:t>
+            </a:r>
+            <a:r>
+              <a:rPr lang="ro-RO" dirty="0"/>
+              <a:t>creează o lume și se pun </a:t>
+            </a:r>
+            <a:r>
+              <a:rPr lang="ro-RO" b="1" dirty="0"/>
+              <a:t>10+nivel actual</a:t>
+            </a:r>
+            <a:r>
+              <a:rPr lang="ro-RO" dirty="0"/>
+              <a:t> </a:t>
+            </a:r>
+            <a:r>
+              <a:rPr lang="ro-RO" dirty="0" smtClean="0"/>
+              <a:t>pacienți</a:t>
+            </a:r>
+            <a:r>
+              <a:rPr lang="en-US" dirty="0" smtClean="0"/>
+              <a:t>;</a:t>
+            </a:r>
+            <a:endParaRPr lang="ro-RO" dirty="0"/>
+          </a:p>
+          <a:p>
+            <a:pPr indent="14288"/>
+            <a:r>
+              <a:rPr lang="ro-RO" dirty="0" smtClean="0"/>
+              <a:t>clasa </a:t>
+            </a:r>
+            <a:r>
+              <a:rPr lang="ro-RO" dirty="0"/>
+              <a:t>„</a:t>
+            </a:r>
+            <a:r>
+              <a:rPr lang="ro-RO" dirty="0" err="1"/>
+              <a:t>Ambulance</a:t>
+            </a:r>
+            <a:r>
+              <a:rPr lang="ro-RO" dirty="0"/>
+              <a:t>” este creierul jocului și se ocupă cu controalele, cu citirea datelor utilizatorului, cu </a:t>
+            </a:r>
+            <a:r>
+              <a:rPr lang="ro-RO" dirty="0" err="1"/>
+              <a:t>acting-ul</a:t>
+            </a:r>
+            <a:r>
+              <a:rPr lang="ro-RO" dirty="0"/>
+              <a:t> și cu afișarea </a:t>
+            </a:r>
+            <a:r>
+              <a:rPr lang="ro-RO" dirty="0" smtClean="0"/>
+              <a:t>output-ului</a:t>
+            </a:r>
+            <a:r>
+              <a:rPr lang="en-US" dirty="0" smtClean="0"/>
+              <a:t>;</a:t>
+            </a:r>
+            <a:endParaRPr lang="ro-RO" dirty="0"/>
+          </a:p>
+          <a:p>
+            <a:pPr indent="14288"/>
+            <a:r>
+              <a:rPr lang="ro-RO" dirty="0" smtClean="0"/>
+              <a:t>celelalte </a:t>
+            </a:r>
+            <a:r>
+              <a:rPr lang="ro-RO" dirty="0"/>
+              <a:t>clase au o funcție „</a:t>
+            </a:r>
+            <a:r>
+              <a:rPr lang="ro-RO" dirty="0" err="1"/>
+              <a:t>addedToWorld</a:t>
+            </a:r>
+            <a:r>
+              <a:rPr lang="ro-RO" dirty="0"/>
+              <a:t>” sau doar „act” ori sunt neconfigurate (Boy</a:t>
+            </a:r>
+            <a:r>
+              <a:rPr lang="ro-RO" dirty="0" smtClean="0"/>
+              <a:t>)</a:t>
+            </a:r>
+            <a:r>
+              <a:rPr lang="en-US" dirty="0"/>
+              <a:t>.</a:t>
+            </a:r>
+            <a:endParaRPr lang="ro-RO" dirty="0"/>
           </a:p>
           <a:p>
             <a:pPr marL="0" indent="0">
@@ -6252,149 +6422,79 @@
             </a:pPr>
             <a:r>
               <a:rPr lang="ro-RO" dirty="0"/>
-              <a:t>   Pentru a rula acest joc:</a:t>
-            </a:r>
-          </a:p>
-          <a:p>
-            <a:pPr marL="0" indent="0">
-              <a:buNone/>
-            </a:pPr>
-            <a:r>
-              <a:rPr lang="ro-RO" dirty="0"/>
-              <a:t>      -extrageți conținutul arhivei</a:t>
-            </a:r>
-          </a:p>
-          <a:p>
-            <a:pPr marL="0" indent="0">
-              <a:buNone/>
-            </a:pPr>
-            <a:r>
-              <a:rPr lang="ro-RO" dirty="0"/>
-              <a:t>      -rulați „</a:t>
-            </a:r>
-            <a:r>
-              <a:rPr lang="ro-RO" dirty="0" err="1"/>
-              <a:t>project.greenfoot</a:t>
-            </a:r>
-            <a:r>
-              <a:rPr lang="ro-RO" dirty="0"/>
-              <a:t>”</a:t>
-            </a:r>
-          </a:p>
-          <a:p>
-            <a:pPr marL="0" indent="0">
-              <a:buNone/>
-            </a:pPr>
-            <a:r>
-              <a:rPr lang="ro-RO" dirty="0"/>
-              <a:t>      -apăsați „</a:t>
-            </a:r>
-            <a:r>
-              <a:rPr lang="ro-RO" dirty="0" err="1"/>
-              <a:t>Run</a:t>
-            </a:r>
-            <a:r>
-              <a:rPr lang="ro-RO" dirty="0"/>
-              <a:t>” pentru a începe jocul (veți avea dreptul la </a:t>
-            </a:r>
-            <a:r>
-              <a:rPr lang="ro-RO" dirty="0" err="1"/>
-              <a:t>username</a:t>
-            </a:r>
-            <a:r>
-              <a:rPr lang="ro-RO" dirty="0"/>
-              <a:t> numai după ce jucați un nivel)</a:t>
-            </a:r>
-          </a:p>
-          <a:p>
-            <a:pPr marL="0" indent="0">
-              <a:buNone/>
-            </a:pPr>
-            <a:r>
-              <a:rPr lang="ro-RO" dirty="0"/>
-              <a:t>   </a:t>
-            </a:r>
-            <a:r>
-              <a:rPr lang="ro-RO" b="1" dirty="0"/>
-              <a:t>Controale:</a:t>
-            </a:r>
-            <a:endParaRPr lang="ro-RO" dirty="0"/>
-          </a:p>
-          <a:p>
-            <a:pPr marL="0" indent="0">
-              <a:buNone/>
-            </a:pPr>
-            <a:r>
-              <a:rPr lang="ro-RO" dirty="0"/>
-              <a:t>      -săgeți sau WASD pentru mișcare</a:t>
-            </a:r>
-          </a:p>
-          <a:p>
-            <a:pPr marL="0" indent="0">
-              <a:buNone/>
-            </a:pPr>
-            <a:r>
-              <a:rPr lang="ro-RO" dirty="0"/>
-              <a:t>      -Q pentru a folosi puterea timp bonus (nivel 5+)</a:t>
-            </a:r>
-          </a:p>
-          <a:p>
-            <a:pPr marL="0" indent="0">
-              <a:buNone/>
-            </a:pPr>
-            <a:r>
-              <a:rPr lang="ro-RO" dirty="0"/>
-              <a:t>      -E pentru a folosi puterea viață bonus (nivel 10+)</a:t>
-            </a:r>
-          </a:p>
-          <a:p>
-            <a:pPr marL="0" indent="0">
-              <a:buNone/>
-            </a:pPr>
-            <a:r>
-              <a:rPr lang="ro-RO" dirty="0"/>
-              <a:t>      -P pentru pauză</a:t>
-            </a:r>
-          </a:p>
-          <a:p>
-            <a:pPr marL="0" indent="0">
-              <a:buNone/>
-            </a:pPr>
-            <a:r>
-              <a:rPr lang="ro-RO" dirty="0"/>
-              <a:t>   </a:t>
-            </a:r>
-            <a:r>
-              <a:rPr lang="ro-RO" b="1" dirty="0"/>
-              <a:t>Notă: </a:t>
-            </a:r>
-            <a:r>
-              <a:rPr lang="ro-RO" dirty="0"/>
-              <a:t>Textul „</a:t>
-            </a:r>
-            <a:r>
-              <a:rPr lang="ro-RO" dirty="0" err="1"/>
-              <a:t>Level</a:t>
-            </a:r>
-            <a:r>
-              <a:rPr lang="ro-RO" dirty="0"/>
-              <a:t>/</a:t>
-            </a:r>
-            <a:r>
-              <a:rPr lang="ro-RO" dirty="0" err="1"/>
-              <a:t>saved</a:t>
-            </a:r>
-            <a:r>
-              <a:rPr lang="ro-RO" dirty="0"/>
-              <a:t>/total” reprezintă „nivelul + omuleții salvați din totalul de X omuleți”.</a:t>
-            </a:r>
-          </a:p>
-        </p:txBody>
-      </p:sp>
+              <a:t>   S-au folosit documentația Greenfoot și unele informații de pe site-ul </a:t>
+            </a:r>
+            <a:r>
+              <a:rPr lang="en-US" dirty="0" smtClean="0">
+                <a:hlinkClick r:id="rId2"/>
+              </a:rPr>
+              <a:t>www.</a:t>
+            </a:r>
+            <a:r>
+              <a:rPr lang="ro-RO" dirty="0" smtClean="0">
+                <a:hlinkClick r:id="rId2"/>
+              </a:rPr>
+              <a:t>stackexchange.com</a:t>
+            </a:r>
+            <a:r>
+              <a:rPr lang="en-US" dirty="0" smtClean="0"/>
+              <a:t> </a:t>
+            </a:r>
+            <a:r>
+              <a:rPr lang="ro-RO" dirty="0" smtClean="0"/>
+              <a:t>(informații </a:t>
+            </a:r>
+            <a:r>
+              <a:rPr lang="ro-RO" dirty="0"/>
+              <a:t>privitoare la optimizarea fișierului de proprietăți), iar sunetele provin de pe site-ul </a:t>
+            </a:r>
+            <a:r>
+              <a:rPr lang="ro-RO" dirty="0">
+                <a:hlinkClick r:id="rId3"/>
+              </a:rPr>
+              <a:t>www.freesound.org</a:t>
+            </a:r>
+            <a:r>
+              <a:rPr lang="ro-RO" dirty="0"/>
+              <a:t> .</a:t>
+            </a:r>
+          </a:p>
+        </p:txBody>
+      </p:sp>
+      <p:pic>
+        <p:nvPicPr>
+          <p:cNvPr id="4" name="Imagine 3"/>
+          <p:cNvPicPr>
+            <a:picLocks noChangeAspect="1"/>
+          </p:cNvPicPr>
+          <p:nvPr/>
+        </p:nvPicPr>
+        <p:blipFill>
+          <a:blip r:embed="rId4">
+            <a:extLst>
+              <a:ext uri="{28A0092B-C50C-407E-A947-70E740481C1C}">
+                <a14:useLocalDpi xmlns:a14="http://schemas.microsoft.com/office/drawing/2010/main" val="0"/>
+              </a:ext>
+            </a:extLst>
+          </a:blip>
+          <a:stretch>
+            <a:fillRect/>
+          </a:stretch>
+        </p:blipFill>
+        <p:spPr>
+          <a:xfrm>
+            <a:off x="677334" y="791038"/>
+            <a:ext cx="762106" cy="476316"/>
+          </a:xfrm>
+          <a:prstGeom prst="rect">
+            <a:avLst/>
+          </a:prstGeom>
+        </p:spPr>
+      </p:pic>
     </p:spTree>
     <p:extLst>
       <p:ext uri="{BB962C8B-B14F-4D97-AF65-F5344CB8AC3E}">
-        <p14:creationId xmlns:p14="http://schemas.microsoft.com/office/powerpoint/2010/main" val="1570812988"/>
+        <p14:creationId xmlns:p14="http://schemas.microsoft.com/office/powerpoint/2010/main" val="3306733575"/>
       </p:ext>
     </p:extLst>
   </p:cSld>
@@ -6404,6 +6504,13 @@
   <p:transition spd="med">
     <p:pull/>
   </p:transition>
+  <p:timing>
+    <p:tnLst>
+      <p:par>
+        <p:cTn id="1" dur="indefinite" restart="never" nodeType="tmRoot"/>
+      </p:par>
+    </p:tnLst>
+  </p:timing>
 </p:sld>
 </file>
 
@@ -6442,7 +6549,7 @@
             <a:pPr algn="ctr"/>
             <a:r>
               <a:rPr lang="ro-RO" dirty="0"/>
-              <a:t>Algoritmul folosit</a:t>
+              <a:t>Idee și execuție</a:t>
             </a:r>
           </a:p>
         </p:txBody>
@@ -6459,12 +6566,14 @@
         </p:nvSpPr>
         <p:spPr>
           <a:xfrm>
-            <a:off x="677334" y="1448791"/>
-            <a:ext cx="8596668" cy="4592572"/>
+            <a:off x="677334" y="1754909"/>
+            <a:ext cx="8596668" cy="4764644"/>
           </a:xfrm>
         </p:spPr>
         <p:txBody>
-          <a:bodyPr/>
+          <a:bodyPr>
+            <a:normAutofit fontScale="92500" lnSpcReduction="10000"/>
+          </a:bodyPr>
           <a:lstStyle/>
           <a:p>
             <a:pPr marL="0" indent="0">
@@ -6472,7 +6581,7 @@
             </a:pPr>
             <a:r>
               <a:rPr lang="ro-RO" dirty="0"/>
-              <a:t>   Structura algoritmului este următoarea:</a:t>
+              <a:t>   Jocul s-a născut din simple teste de cunoștințe, dar s-a dovedit a avea un potențial ridicat … așa că îl vom exploata :) .</a:t>
             </a:r>
           </a:p>
           <a:p>
@@ -6481,11 +6590,7 @@
             </a:pPr>
             <a:r>
               <a:rPr lang="ro-RO" dirty="0"/>
-              <a:t>      </a:t>
-            </a:r>
-            <a:r>
-              <a:rPr lang="ro-RO" dirty="0"/>
-              <a:t>-se creează un fișier numit „res.txt” care conține datele utilizatorului (dacă acesta există deja, nu va fi înlocuit de unul nou)</a:t>
+              <a:t>   Pentru a rula acest joc:</a:t>
             </a:r>
           </a:p>
           <a:p>
@@ -6494,15 +6599,15 @@
             </a:pPr>
             <a:r>
               <a:rPr lang="ro-RO" dirty="0"/>
-              <a:t>      </a:t>
-            </a:r>
-            <a:r>
-              <a:rPr lang="en-US" dirty="0"/>
-              <a:t>-se </a:t>
-            </a:r>
-            <a:r>
-              <a:rPr lang="ro-RO" dirty="0"/>
-              <a:t>adaugă o ambulanță și, dacă nivelul este mai mare de 5, 3 construcții, respectiv, dacă este mai mare decât 10, 5 construcții în total</a:t>
+              <a:t>      -extrageți conținutul </a:t>
+            </a:r>
+            <a:r>
+              <a:rPr lang="ro-RO" dirty="0" smtClean="0"/>
+              <a:t>arhivei</a:t>
+            </a:r>
+            <a:r>
+              <a:rPr lang="en-US" dirty="0" smtClean="0"/>
+              <a:t>;</a:t>
             </a:r>
             <a:endParaRPr lang="ro-RO" dirty="0"/>
           </a:p>
@@ -6512,16 +6617,69 @@
             </a:pPr>
             <a:r>
               <a:rPr lang="ro-RO" dirty="0"/>
-              <a:t>      -se creează o lume și se pun </a:t>
+              <a:t>      -rulați „</a:t>
+            </a:r>
+            <a:r>
+              <a:rPr lang="ro-RO" dirty="0" err="1"/>
+              <a:t>project.greenfoot</a:t>
+            </a:r>
+            <a:r>
+              <a:rPr lang="ro-RO" dirty="0" smtClean="0"/>
+              <a:t>”</a:t>
+            </a:r>
+            <a:r>
+              <a:rPr lang="en-US" dirty="0" smtClean="0"/>
+              <a:t>;</a:t>
+            </a:r>
+            <a:endParaRPr lang="ro-RO" dirty="0"/>
+          </a:p>
+          <a:p>
+            <a:pPr marL="0" indent="0">
+              <a:buNone/>
+            </a:pPr>
+            <a:r>
+              <a:rPr lang="ro-RO" dirty="0"/>
+              <a:t>      -apăsați „</a:t>
+            </a:r>
+            <a:r>
+              <a:rPr lang="ro-RO" dirty="0" err="1"/>
+              <a:t>Run</a:t>
+            </a:r>
+            <a:r>
+              <a:rPr lang="ro-RO" dirty="0"/>
+              <a:t>” pentru a începe jocul (veți avea dreptul la </a:t>
+            </a:r>
+            <a:r>
+              <a:rPr lang="ro-RO" dirty="0" err="1"/>
+              <a:t>username</a:t>
+            </a:r>
+            <a:r>
+              <a:rPr lang="ro-RO" dirty="0"/>
+              <a:t> numai după ce jucați un nivel</a:t>
+            </a:r>
+            <a:r>
+              <a:rPr lang="ro-RO" dirty="0" smtClean="0"/>
+              <a:t>)</a:t>
+            </a:r>
+            <a:r>
+              <a:rPr lang="en-US" dirty="0" smtClean="0"/>
+              <a:t>.</a:t>
+            </a:r>
+            <a:endParaRPr lang="ro-RO" dirty="0"/>
+          </a:p>
+          <a:p>
+            <a:pPr marL="0" indent="0">
+              <a:buNone/>
+            </a:pPr>
+            <a:r>
+              <a:rPr lang="ro-RO" dirty="0"/>
+              <a:t>   </a:t>
             </a:r>
             <a:r>
               <a:rPr lang="ro-RO" b="1" dirty="0"/>
-              <a:t>10+nivel actual</a:t>
-            </a:r>
-            <a:r>
-              <a:rPr lang="ro-RO" dirty="0"/>
-              <a:t> actori băieți </a:t>
-            </a:r>
+              <a:t>Controale:</a:t>
+            </a:r>
+            <a:endParaRPr lang="ro-RO" dirty="0"/>
           </a:p>
           <a:p>
             <a:pPr marL="0" indent="0">
@@ -6529,59 +6687,115 @@
             </a:pPr>
             <a:r>
               <a:rPr lang="ro-RO" dirty="0"/>
-              <a:t>      -clasa „</a:t>
+              <a:t>      -săgeți sau WASD pentru </a:t>
+            </a:r>
+            <a:r>
+              <a:rPr lang="ro-RO" dirty="0" smtClean="0"/>
+              <a:t>mișcare</a:t>
+            </a:r>
+            <a:r>
+              <a:rPr lang="en-US" dirty="0" smtClean="0"/>
+              <a:t>;</a:t>
+            </a:r>
+            <a:endParaRPr lang="ro-RO" dirty="0"/>
+          </a:p>
+          <a:p>
+            <a:pPr marL="0" indent="0">
+              <a:buNone/>
+            </a:pPr>
+            <a:r>
+              <a:rPr lang="ro-RO" dirty="0"/>
+              <a:t>      -Q pentru a folosi puterea timp bonus </a:t>
+            </a:r>
+            <a:r>
+              <a:rPr lang="ro-RO" dirty="0" smtClean="0"/>
+              <a:t>(se poate utiliza </a:t>
+            </a:r>
+            <a:r>
+              <a:rPr lang="ro-RO" dirty="0" smtClean="0"/>
+              <a:t>de la nivelul 5</a:t>
+            </a:r>
+            <a:r>
+              <a:rPr lang="ro-RO" dirty="0" smtClean="0"/>
+              <a:t>)</a:t>
+            </a:r>
+            <a:r>
+              <a:rPr lang="en-US" dirty="0" smtClean="0"/>
+              <a:t>;</a:t>
+            </a:r>
+            <a:endParaRPr lang="ro-RO" dirty="0"/>
+          </a:p>
+          <a:p>
+            <a:pPr marL="0" indent="0">
+              <a:buNone/>
+            </a:pPr>
+            <a:r>
+              <a:rPr lang="ro-RO" dirty="0"/>
+              <a:t>      -E pentru a folosi puterea viață bonus </a:t>
+            </a:r>
+            <a:r>
+              <a:rPr lang="ro-RO" dirty="0"/>
+              <a:t>(se poate utiliza de la nivelul </a:t>
+            </a:r>
+            <a:r>
+              <a:rPr lang="ro-RO" dirty="0" smtClean="0"/>
+              <a:t>10)</a:t>
+            </a:r>
+            <a:r>
+              <a:rPr lang="en-US" dirty="0" smtClean="0"/>
+              <a:t>;</a:t>
+            </a:r>
+            <a:endParaRPr lang="ro-RO" dirty="0"/>
+          </a:p>
+          <a:p>
+            <a:pPr marL="0" indent="0">
+              <a:buNone/>
+            </a:pPr>
+            <a:r>
+              <a:rPr lang="ro-RO" dirty="0"/>
+              <a:t>      -P pentru </a:t>
+            </a:r>
+            <a:r>
+              <a:rPr lang="ro-RO" dirty="0" smtClean="0"/>
+              <a:t>pauză</a:t>
+            </a:r>
+            <a:r>
+              <a:rPr lang="en-US" dirty="0" smtClean="0"/>
+              <a:t>.</a:t>
+            </a:r>
+            <a:endParaRPr lang="ro-RO" dirty="0"/>
+          </a:p>
+          <a:p>
+            <a:pPr marL="0" indent="0">
+              <a:buNone/>
+            </a:pPr>
+            <a:r>
+              <a:rPr lang="ro-RO" dirty="0"/>
+              <a:t>   </a:t>
+            </a:r>
+            <a:r>
+              <a:rPr lang="ro-RO" b="1" dirty="0"/>
+              <a:t>Notă: </a:t>
+            </a:r>
+            <a:r>
+              <a:rPr lang="ro-RO" dirty="0"/>
+              <a:t>Textul „</a:t>
             </a:r>
             <a:r>
               <a:rPr lang="ro-RO" dirty="0" err="1"/>
-              <a:t>Ambulance</a:t>
-            </a:r>
-            <a:r>
-              <a:rPr lang="ro-RO" dirty="0"/>
-              <a:t>” este creierul jocului și se ocupă cu controalele, cu citirea datelor utilizatorului, cu </a:t>
+              <a:t>Level</a:t>
+            </a:r>
+            <a:r>
+              <a:rPr lang="ro-RO" dirty="0"/>
+              <a:t>/</a:t>
             </a:r>
             <a:r>
               <a:rPr lang="ro-RO" dirty="0" err="1"/>
-              <a:t>acting-ul</a:t>
-            </a:r>
-            <a:r>
-              <a:rPr lang="ro-RO" dirty="0"/>
-              <a:t> și cu afișarea output-ului</a:t>
-            </a:r>
-          </a:p>
-          <a:p>
-            <a:pPr marL="0" indent="0">
-              <a:buNone/>
-            </a:pPr>
-            <a:r>
-              <a:rPr lang="ro-RO" dirty="0"/>
-              <a:t>      -celelalte clase au o funcție „</a:t>
-            </a:r>
-            <a:r>
-              <a:rPr lang="ro-RO" dirty="0" err="1"/>
-              <a:t>addedToWorld</a:t>
-            </a:r>
-            <a:r>
-              <a:rPr lang="ro-RO" dirty="0"/>
-              <a:t>” sau doar „act” ori sunt neconfigurate (Boy)</a:t>
-            </a:r>
-          </a:p>
-          <a:p>
-            <a:pPr marL="0" indent="0">
-              <a:buNone/>
-            </a:pPr>
-            <a:r>
-              <a:rPr lang="ro-RO" dirty="0"/>
-              <a:t>   S-au folosit documentația Greenfoot și unele informații de pe site-ul stackexchange.com (informații privitoare la optimizarea fișierului de proprietăți), iar sunetele provin de pe site-ul </a:t>
-            </a:r>
-            <a:r>
-              <a:rPr lang="ro-RO" dirty="0">
-                <a:hlinkClick r:id="rId2"/>
-              </a:rPr>
-              <a:t>www.freesound.org</a:t>
-            </a:r>
-            <a:r>
-              <a:rPr lang="ro-RO" dirty="0"/>
-              <a:t> .</a:t>
+              <a:t>saved</a:t>
+            </a:r>
+            <a:r>
+              <a:rPr lang="ro-RO" dirty="0"/>
+              <a:t>/total” reprezintă „nivelul + omuleții salvați din totalul de X omuleți”.</a:t>
             </a:r>
           </a:p>
         </p:txBody>
@@ -6589,7 +6803,7 @@
     </p:spTree>
     <p:extLst>
       <p:ext uri="{BB962C8B-B14F-4D97-AF65-F5344CB8AC3E}">
-        <p14:creationId xmlns:p14="http://schemas.microsoft.com/office/powerpoint/2010/main" val="3306733575"/>
+        <p14:creationId xmlns:p14="http://schemas.microsoft.com/office/powerpoint/2010/main" val="1570812988"/>
       </p:ext>
     </p:extLst>
   </p:cSld>
@@ -6599,6 +6813,13 @@
   <p:transition spd="med">
     <p:pull/>
   </p:transition>
+  <p:timing>
+    <p:tnLst>
+      <p:par>
+        <p:cTn id="1" dur="indefinite" restart="never" nodeType="tmRoot"/>
+      </p:par>
+    </p:tnLst>
+  </p:timing>
 </p:sld>
 </file>
 

</xml_diff>